<commit_message>
added a larger apply section calling for the skill to be applied to unit specific problemsets
</commit_message>
<xml_diff>
--- a/Counter_Malign_Information/4-Implement-For_Instructors/Lesson_Plans/Lesson_01-Creating_Synthetic_Content/Audio_Visual-Creating_Synthetic_Content/En-Lesson_Slide-Create_AI_Content.pptx
+++ b/Counter_Malign_Information/4-Implement-For_Instructors/Lesson_Plans/Lesson_01-Creating_Synthetic_Content/Audio_Visual-Creating_Synthetic_Content/En-Lesson_Slide-Create_AI_Content.pptx
@@ -5,7 +5,7 @@
     <p:sldMasterId id="2147483648" r:id="rId1"/>
   </p:sldMasterIdLst>
   <p:notesMasterIdLst>
-    <p:notesMasterId r:id="rId14"/>
+    <p:notesMasterId r:id="rId15"/>
   </p:notesMasterIdLst>
   <p:sldIdLst>
     <p:sldId id="257" r:id="rId2"/>
@@ -17,9 +17,10 @@
     <p:sldId id="265" r:id="rId8"/>
     <p:sldId id="273" r:id="rId9"/>
     <p:sldId id="275" r:id="rId10"/>
-    <p:sldId id="269" r:id="rId11"/>
-    <p:sldId id="267" r:id="rId12"/>
-    <p:sldId id="271" r:id="rId13"/>
+    <p:sldId id="282" r:id="rId11"/>
+    <p:sldId id="269" r:id="rId12"/>
+    <p:sldId id="267" r:id="rId13"/>
+    <p:sldId id="271" r:id="rId14"/>
   </p:sldIdLst>
   <p:sldSz cx="12192000" cy="6858000"/>
   <p:notesSz cx="6858000" cy="9144000"/>
@@ -485,6 +486,175 @@
 </p:notesMaster>
 </file>
 
+<file path=ppt/notesSlides/notesSlide1.xml><?xml version="1.0" encoding="utf-8"?>
+<p:notes xmlns:a="http://schemas.openxmlformats.org/drawingml/2006/main" xmlns:r="http://schemas.openxmlformats.org/officeDocument/2006/relationships" xmlns:p="http://schemas.openxmlformats.org/presentationml/2006/main">
+  <p:cSld>
+    <p:spTree>
+      <p:nvGrpSpPr>
+        <p:cNvPr id="1" name=""/>
+        <p:cNvGrpSpPr/>
+        <p:nvPr/>
+      </p:nvGrpSpPr>
+      <p:grpSpPr>
+        <a:xfrm>
+          <a:off x="0" y="0"/>
+          <a:ext cx="0" cy="0"/>
+          <a:chOff x="0" y="0"/>
+          <a:chExt cx="0" cy="0"/>
+        </a:xfrm>
+      </p:grpSpPr>
+      <p:sp>
+        <p:nvSpPr>
+          <p:cNvPr id="2" name="Slide Image Placeholder 1"/>
+          <p:cNvSpPr>
+            <a:spLocks noGrp="1" noRot="1" noChangeAspect="1"/>
+          </p:cNvSpPr>
+          <p:nvPr>
+            <p:ph type="sldImg"/>
+          </p:nvPr>
+        </p:nvSpPr>
+        <p:spPr>
+          <a:xfrm>
+            <a:off x="381000" y="685800"/>
+            <a:ext cx="6096000" cy="3429000"/>
+          </a:xfrm>
+        </p:spPr>
+      </p:sp>
+      <p:sp>
+        <p:nvSpPr>
+          <p:cNvPr id="3" name="Notes Placeholder 2"/>
+          <p:cNvSpPr>
+            <a:spLocks noGrp="1"/>
+          </p:cNvSpPr>
+          <p:nvPr>
+            <p:ph type="body" idx="1"/>
+          </p:nvPr>
+        </p:nvSpPr>
+        <p:spPr/>
+        <p:txBody>
+          <a:bodyPr/>
+          <a:lstStyle/>
+          <a:p>
+            <a:endParaRPr lang="en-US" dirty="0"/>
+          </a:p>
+        </p:txBody>
+      </p:sp>
+    </p:spTree>
+    <p:extLst>
+      <p:ext uri="{BB962C8B-B14F-4D97-AF65-F5344CB8AC3E}">
+        <p14:creationId xmlns:p14="http://schemas.microsoft.com/office/powerpoint/2010/main" val="4063643676"/>
+      </p:ext>
+    </p:extLst>
+  </p:cSld>
+  <p:clrMapOvr>
+    <a:masterClrMapping/>
+  </p:clrMapOvr>
+</p:notes>
+</file>
+
+<file path=ppt/notesSlides/notesSlide2.xml><?xml version="1.0" encoding="utf-8"?>
+<p:notes xmlns:a="http://schemas.openxmlformats.org/drawingml/2006/main" xmlns:r="http://schemas.openxmlformats.org/officeDocument/2006/relationships" xmlns:p="http://schemas.openxmlformats.org/presentationml/2006/main">
+  <p:cSld>
+    <p:spTree>
+      <p:nvGrpSpPr>
+        <p:cNvPr id="1" name=""/>
+        <p:cNvGrpSpPr/>
+        <p:nvPr/>
+      </p:nvGrpSpPr>
+      <p:grpSpPr>
+        <a:xfrm>
+          <a:off x="0" y="0"/>
+          <a:ext cx="0" cy="0"/>
+          <a:chOff x="0" y="0"/>
+          <a:chExt cx="0" cy="0"/>
+        </a:xfrm>
+      </p:grpSpPr>
+      <p:sp>
+        <p:nvSpPr>
+          <p:cNvPr id="2" name="Slide Image Placeholder 1"/>
+          <p:cNvSpPr>
+            <a:spLocks noGrp="1" noRot="1" noChangeAspect="1"/>
+          </p:cNvSpPr>
+          <p:nvPr>
+            <p:ph type="sldImg"/>
+          </p:nvPr>
+        </p:nvSpPr>
+        <p:spPr>
+          <a:xfrm>
+            <a:off x="381000" y="685800"/>
+            <a:ext cx="6096000" cy="3429000"/>
+          </a:xfrm>
+        </p:spPr>
+      </p:sp>
+      <p:sp>
+        <p:nvSpPr>
+          <p:cNvPr id="3" name="Notes Placeholder 2"/>
+          <p:cNvSpPr>
+            <a:spLocks noGrp="1"/>
+          </p:cNvSpPr>
+          <p:nvPr>
+            <p:ph type="body" idx="1"/>
+          </p:nvPr>
+        </p:nvSpPr>
+        <p:spPr/>
+        <p:txBody>
+          <a:bodyPr/>
+          <a:lstStyle/>
+          <a:p>
+            <a:pPr marL="171450" indent="-171450">
+              <a:buFontTx/>
+              <a:buChar char="-"/>
+            </a:pPr>
+            <a:r>
+              <a:rPr lang="en-US" dirty="0"/>
+              <a:t>In what new ways could you apply this lesson at your organization?</a:t>
+            </a:r>
+          </a:p>
+          <a:p>
+            <a:pPr marL="171450" indent="-171450">
+              <a:buFontTx/>
+              <a:buChar char="-"/>
+            </a:pPr>
+            <a:r>
+              <a:rPr lang="en-US" dirty="0"/>
+              <a:t>What obstacles do you think you will face applying this at your organization?</a:t>
+            </a:r>
+          </a:p>
+          <a:p>
+            <a:pPr marL="171450" lvl="1" indent="-171450">
+              <a:buFontTx/>
+              <a:buChar char="-"/>
+            </a:pPr>
+            <a:r>
+              <a:rPr lang="en-US" dirty="0"/>
+              <a:t>How can you overcome those obstacles? </a:t>
+            </a:r>
+          </a:p>
+          <a:p>
+            <a:pPr marL="171450" lvl="1" indent="-171450">
+              <a:buFontTx/>
+              <a:buChar char="-"/>
+            </a:pPr>
+            <a:r>
+              <a:rPr lang="en-US" dirty="0"/>
+              <a:t>Who else should learn about this?</a:t>
+            </a:r>
+          </a:p>
+        </p:txBody>
+      </p:sp>
+    </p:spTree>
+    <p:extLst>
+      <p:ext uri="{BB962C8B-B14F-4D97-AF65-F5344CB8AC3E}">
+        <p14:creationId xmlns:p14="http://schemas.microsoft.com/office/powerpoint/2010/main" val="649645249"/>
+      </p:ext>
+    </p:extLst>
+  </p:cSld>
+  <p:clrMapOvr>
+    <a:masterClrMapping/>
+  </p:clrMapOvr>
+</p:notes>
+</file>
+
 <file path=ppt/slideLayouts/slideLayout1.xml><?xml version="1.0" encoding="utf-8"?>
 <p:sldLayout xmlns:a="http://schemas.openxmlformats.org/drawingml/2006/main" xmlns:r="http://schemas.openxmlformats.org/officeDocument/2006/relationships" xmlns:p="http://schemas.openxmlformats.org/presentationml/2006/main" type="title">
   <p:cSld name="Title Slide">
@@ -2270,7 +2440,7 @@
           </a:ln>
           <a:extLst>
             <a:ext uri="{C572A759-6A51-4108-AA02-DFA0A04FC94B}">
-              <ma14:wrappingTextBoxFlag xmlns:ma14="http://schemas.microsoft.com/office/mac/drawingml/2011/main" xmlns:a14="http://schemas.microsoft.com/office/drawing/2010/main" xmlns:m="http://schemas.openxmlformats.org/officeDocument/2006/math" xmlns="" val="1"/>
+              <ma14:wrappingTextBoxFlag xmlns="" xmlns:m="http://schemas.openxmlformats.org/officeDocument/2006/math" xmlns:a14="http://schemas.microsoft.com/office/drawing/2010/main" xmlns:ma14="http://schemas.microsoft.com/office/mac/drawingml/2011/main" val="1"/>
             </a:ext>
           </a:extLst>
         </p:spPr>
@@ -2309,7 +2479,7 @@
           </a:ln>
           <a:extLst>
             <a:ext uri="{C572A759-6A51-4108-AA02-DFA0A04FC94B}">
-              <ma14:wrappingTextBoxFlag xmlns:ma14="http://schemas.microsoft.com/office/mac/drawingml/2011/main" xmlns:a14="http://schemas.microsoft.com/office/drawing/2010/main" xmlns:m="http://schemas.openxmlformats.org/officeDocument/2006/math" xmlns="" val="1"/>
+              <ma14:wrappingTextBoxFlag xmlns="" xmlns:m="http://schemas.openxmlformats.org/officeDocument/2006/math" xmlns:a14="http://schemas.microsoft.com/office/drawing/2010/main" xmlns:ma14="http://schemas.microsoft.com/office/mac/drawingml/2011/main" val="1"/>
             </a:ext>
           </a:extLst>
         </p:spPr>
@@ -3246,6 +3416,338 @@
 <file path=ppt/slides/slide10.xml><?xml version="1.0" encoding="utf-8"?>
 <p:sld xmlns:a="http://schemas.openxmlformats.org/drawingml/2006/main" xmlns:r="http://schemas.openxmlformats.org/officeDocument/2006/relationships" xmlns:p="http://schemas.openxmlformats.org/presentationml/2006/main">
   <p:cSld>
+    <p:spTree>
+      <p:nvGrpSpPr>
+        <p:cNvPr id="1" name=""/>
+        <p:cNvGrpSpPr/>
+        <p:nvPr/>
+      </p:nvGrpSpPr>
+      <p:grpSpPr>
+        <a:xfrm>
+          <a:off x="0" y="0"/>
+          <a:ext cx="0" cy="0"/>
+          <a:chOff x="0" y="0"/>
+          <a:chExt cx="0" cy="0"/>
+        </a:xfrm>
+      </p:grpSpPr>
+      <p:sp>
+        <p:nvSpPr>
+          <p:cNvPr id="2" name="Title 1">
+            <a:extLst>
+              <a:ext uri="{FF2B5EF4-FFF2-40B4-BE49-F238E27FC236}">
+                <a16:creationId xmlns:a16="http://schemas.microsoft.com/office/drawing/2014/main" id="{0F71ECB2-3D50-0D11-2D28-A4DF82A85675}"/>
+              </a:ext>
+            </a:extLst>
+          </p:cNvPr>
+          <p:cNvSpPr>
+            <a:spLocks noGrp="1"/>
+          </p:cNvSpPr>
+          <p:nvPr>
+            <p:ph type="title"/>
+          </p:nvPr>
+        </p:nvSpPr>
+        <p:spPr/>
+        <p:txBody>
+          <a:bodyPr/>
+          <a:lstStyle/>
+          <a:p>
+            <a:r>
+              <a:rPr lang="en-US" b="0" dirty="0"/>
+              <a:t>Practice Prompt</a:t>
+            </a:r>
+            <a:endParaRPr lang="en-US" dirty="0"/>
+          </a:p>
+        </p:txBody>
+      </p:sp>
+      <p:sp>
+        <p:nvSpPr>
+          <p:cNvPr id="3" name="Text Placeholder 2">
+            <a:extLst>
+              <a:ext uri="{FF2B5EF4-FFF2-40B4-BE49-F238E27FC236}">
+                <a16:creationId xmlns:a16="http://schemas.microsoft.com/office/drawing/2014/main" id="{C886A268-87E8-D4D3-2986-67443C038647}"/>
+              </a:ext>
+            </a:extLst>
+          </p:cNvPr>
+          <p:cNvSpPr>
+            <a:spLocks noGrp="1"/>
+          </p:cNvSpPr>
+          <p:nvPr>
+            <p:ph type="body" idx="1"/>
+          </p:nvPr>
+        </p:nvSpPr>
+        <p:spPr/>
+        <p:txBody>
+          <a:bodyPr/>
+          <a:lstStyle/>
+          <a:p>
+            <a:pPr marL="0" indent="0">
+              <a:buNone/>
+            </a:pPr>
+            <a:r>
+              <a:rPr lang="en-US" dirty="0"/>
+              <a:t>Create a Template for your organization to:</a:t>
+            </a:r>
+          </a:p>
+          <a:p>
+            <a:pPr marL="514350" indent="-514350">
+              <a:buFont typeface="+mj-lt"/>
+              <a:buAutoNum type="arabicPeriod"/>
+            </a:pPr>
+            <a:r>
+              <a:rPr lang="en-US" dirty="0"/>
+              <a:t>Create Advanced Google Searches to search for rival actor tactics in your area.</a:t>
+            </a:r>
+          </a:p>
+          <a:p>
+            <a:pPr marL="514350" indent="-514350">
+              <a:buFont typeface="+mj-lt"/>
+              <a:buAutoNum type="arabicPeriod"/>
+            </a:pPr>
+            <a:r>
+              <a:rPr lang="en-US" dirty="0"/>
+              <a:t>Create a broad planning guide based on a given problem set your organization typically encounters</a:t>
+            </a:r>
+          </a:p>
+          <a:p>
+            <a:endParaRPr lang="en-US" dirty="0"/>
+          </a:p>
+          <a:p>
+            <a:endParaRPr lang="en-US" dirty="0"/>
+          </a:p>
+        </p:txBody>
+      </p:sp>
+      <p:sp>
+        <p:nvSpPr>
+          <p:cNvPr id="4" name="English">
+            <a:extLst>
+              <a:ext uri="{FF2B5EF4-FFF2-40B4-BE49-F238E27FC236}">
+                <a16:creationId xmlns:a16="http://schemas.microsoft.com/office/drawing/2014/main" id="{7F4F6399-76E7-B29D-958F-FF1DDE3FEE64}"/>
+              </a:ext>
+            </a:extLst>
+          </p:cNvPr>
+          <p:cNvSpPr/>
+          <p:nvPr/>
+        </p:nvSpPr>
+        <p:spPr>
+          <a:xfrm>
+            <a:off x="5133143" y="5997604"/>
+            <a:ext cx="1925714" cy="703748"/>
+          </a:xfrm>
+          <a:prstGeom prst="rect">
+            <a:avLst/>
+          </a:prstGeom>
+          <a:solidFill>
+            <a:schemeClr val="bg1"/>
+          </a:solidFill>
+          <a:ln w="12700">
+            <a:solidFill>
+              <a:schemeClr val="accent1"/>
+            </a:solidFill>
+            <a:miter/>
+          </a:ln>
+          <a:extLst>
+            <a:ext uri="{C572A759-6A51-4108-AA02-DFA0A04FC94B}">
+              <ma14:wrappingTextBoxFlag xmlns:ma14="http://schemas.microsoft.com/office/mac/drawingml/2011/main" xmlns:a14="http://schemas.microsoft.com/office/drawing/2010/main" xmlns:m="http://schemas.openxmlformats.org/officeDocument/2006/math" xmlns="" val="1"/>
+            </a:ext>
+          </a:extLst>
+        </p:spPr>
+        <p:txBody>
+          <a:bodyPr lIns="45719" rIns="45719" anchor="ctr"/>
+          <a:lstStyle>
+            <a:lvl1pPr algn="ctr"/>
+          </a:lstStyle>
+          <a:p>
+            <a:pPr marL="139700" defTabSz="457200">
+              <a:lnSpc>
+                <a:spcPct val="100000"/>
+              </a:lnSpc>
+              <a:spcBef>
+                <a:spcPts val="0"/>
+              </a:spcBef>
+              <a:buClr>
+                <a:srgbClr val="1F2328"/>
+              </a:buClr>
+              <a:defRPr sz="2600">
+                <a:solidFill>
+                  <a:srgbClr val="FF40FF"/>
+                </a:solidFill>
+                <a:latin typeface="Helvetica Neue"/>
+                <a:ea typeface="Helvetica Neue"/>
+                <a:cs typeface="Helvetica Neue"/>
+                <a:sym typeface="Helvetica Neue"/>
+              </a:defRPr>
+            </a:pPr>
+            <a:r>
+              <a:rPr lang="en-US" sz="2000" b="1" dirty="0">
+                <a:latin typeface="+mn-lt"/>
+                <a:ea typeface="+mn-ea"/>
+                <a:cs typeface="+mn-cs"/>
+                <a:sym typeface="Helvetica"/>
+              </a:rPr>
+              <a:t>Provide Context</a:t>
+            </a:r>
+          </a:p>
+        </p:txBody>
+      </p:sp>
+      <p:sp>
+        <p:nvSpPr>
+          <p:cNvPr id="5" name="Spanish">
+            <a:extLst>
+              <a:ext uri="{FF2B5EF4-FFF2-40B4-BE49-F238E27FC236}">
+                <a16:creationId xmlns:a16="http://schemas.microsoft.com/office/drawing/2014/main" id="{D88AF8F7-BC37-BF37-9A9A-167279C67D5D}"/>
+              </a:ext>
+            </a:extLst>
+          </p:cNvPr>
+          <p:cNvSpPr/>
+          <p:nvPr/>
+        </p:nvSpPr>
+        <p:spPr>
+          <a:xfrm>
+            <a:off x="7671549" y="5993635"/>
+            <a:ext cx="2280484" cy="703748"/>
+          </a:xfrm>
+          <a:prstGeom prst="rect">
+            <a:avLst/>
+          </a:prstGeom>
+          <a:solidFill>
+            <a:schemeClr val="bg1"/>
+          </a:solidFill>
+          <a:ln w="12700">
+            <a:solidFill>
+              <a:schemeClr val="accent1"/>
+            </a:solidFill>
+            <a:miter/>
+          </a:ln>
+          <a:extLst>
+            <a:ext uri="{C572A759-6A51-4108-AA02-DFA0A04FC94B}">
+              <ma14:wrappingTextBoxFlag xmlns:ma14="http://schemas.microsoft.com/office/mac/drawingml/2011/main" xmlns:a14="http://schemas.microsoft.com/office/drawing/2010/main" xmlns:m="http://schemas.openxmlformats.org/officeDocument/2006/math" xmlns="" val="1"/>
+            </a:ext>
+          </a:extLst>
+        </p:spPr>
+        <p:txBody>
+          <a:bodyPr lIns="45719" rIns="45719" anchor="ctr"/>
+          <a:lstStyle>
+            <a:lvl1pPr algn="ctr"/>
+          </a:lstStyle>
+          <a:p>
+            <a:pPr marL="139700" defTabSz="457200">
+              <a:buClr>
+                <a:srgbClr val="1F2328"/>
+              </a:buClr>
+              <a:buSzPct val="100000"/>
+              <a:defRPr sz="2600">
+                <a:solidFill>
+                  <a:srgbClr val="942192"/>
+                </a:solidFill>
+                <a:latin typeface="Helvetica Neue"/>
+                <a:ea typeface="Helvetica Neue"/>
+                <a:cs typeface="Helvetica Neue"/>
+                <a:sym typeface="Helvetica Neue"/>
+              </a:defRPr>
+            </a:pPr>
+            <a:r>
+              <a:rPr lang="en-US" sz="2000" b="1" dirty="0">
+                <a:latin typeface="+mn-lt"/>
+                <a:ea typeface="+mn-ea"/>
+                <a:cs typeface="+mn-cs"/>
+                <a:sym typeface="Helvetica"/>
+              </a:rPr>
+              <a:t>Remind AI of Constraints</a:t>
+            </a:r>
+            <a:endParaRPr lang="en-US" sz="2000" dirty="0"/>
+          </a:p>
+        </p:txBody>
+      </p:sp>
+      <p:sp>
+        <p:nvSpPr>
+          <p:cNvPr id="6" name="English">
+            <a:extLst>
+              <a:ext uri="{FF2B5EF4-FFF2-40B4-BE49-F238E27FC236}">
+                <a16:creationId xmlns:a16="http://schemas.microsoft.com/office/drawing/2014/main" id="{022E8016-8DB1-10AA-76B5-51D3F92EBE1C}"/>
+              </a:ext>
+            </a:extLst>
+          </p:cNvPr>
+          <p:cNvSpPr/>
+          <p:nvPr/>
+        </p:nvSpPr>
+        <p:spPr>
+          <a:xfrm>
+            <a:off x="2717850" y="5993635"/>
+            <a:ext cx="1802601" cy="703748"/>
+          </a:xfrm>
+          <a:prstGeom prst="rect">
+            <a:avLst/>
+          </a:prstGeom>
+          <a:solidFill>
+            <a:schemeClr val="bg1"/>
+          </a:solidFill>
+          <a:ln w="12700">
+            <a:solidFill>
+              <a:schemeClr val="accent1"/>
+            </a:solidFill>
+            <a:miter/>
+          </a:ln>
+          <a:extLst>
+            <a:ext uri="{C572A759-6A51-4108-AA02-DFA0A04FC94B}">
+              <ma14:wrappingTextBoxFlag xmlns:ma14="http://schemas.microsoft.com/office/mac/drawingml/2011/main" xmlns:a14="http://schemas.microsoft.com/office/drawing/2010/main" xmlns:m="http://schemas.openxmlformats.org/officeDocument/2006/math" xmlns="" val="1"/>
+            </a:ext>
+          </a:extLst>
+        </p:spPr>
+        <p:txBody>
+          <a:bodyPr lIns="45719" rIns="45719" anchor="ctr"/>
+          <a:lstStyle>
+            <a:lvl1pPr algn="ctr"/>
+          </a:lstStyle>
+          <a:p>
+            <a:pPr marL="139700" defTabSz="457200">
+              <a:lnSpc>
+                <a:spcPct val="100000"/>
+              </a:lnSpc>
+              <a:spcBef>
+                <a:spcPts val="0"/>
+              </a:spcBef>
+              <a:buClr>
+                <a:srgbClr val="1F2328"/>
+              </a:buClr>
+              <a:defRPr sz="2600">
+                <a:solidFill>
+                  <a:srgbClr val="0433FF"/>
+                </a:solidFill>
+                <a:latin typeface="Helvetica Neue"/>
+                <a:ea typeface="Helvetica Neue"/>
+                <a:cs typeface="Helvetica Neue"/>
+                <a:sym typeface="Helvetica Neue"/>
+              </a:defRPr>
+            </a:pPr>
+            <a:r>
+              <a:rPr lang="en-US" sz="2000" b="1" dirty="0">
+                <a:latin typeface="+mn-lt"/>
+                <a:ea typeface="+mn-ea"/>
+                <a:cs typeface="+mn-cs"/>
+                <a:sym typeface="Helvetica"/>
+              </a:rPr>
+              <a:t>Be Specific</a:t>
+            </a:r>
+          </a:p>
+        </p:txBody>
+      </p:sp>
+    </p:spTree>
+    <p:extLst>
+      <p:ext uri="{BB962C8B-B14F-4D97-AF65-F5344CB8AC3E}">
+        <p14:creationId xmlns:p14="http://schemas.microsoft.com/office/powerpoint/2010/main" val="3054613404"/>
+      </p:ext>
+    </p:extLst>
+  </p:cSld>
+  <p:clrMapOvr>
+    <a:masterClrMapping/>
+  </p:clrMapOvr>
+  <p:transition spd="med"/>
+</p:sld>
+</file>
+
+<file path=ppt/slides/slide11.xml><?xml version="1.0" encoding="utf-8"?>
+<p:sld xmlns:a="http://schemas.openxmlformats.org/drawingml/2006/main" xmlns:r="http://schemas.openxmlformats.org/officeDocument/2006/relationships" xmlns:p="http://schemas.openxmlformats.org/presentationml/2006/main">
+  <p:cSld>
     <p:bg>
       <p:bgPr>
         <a:solidFill>
@@ -3277,7 +3779,7 @@
           <p:nvPr/>
         </p:nvPicPr>
         <p:blipFill>
-          <a:blip r:embed="rId2"/>
+          <a:blip r:embed="rId3"/>
           <a:stretch>
             <a:fillRect/>
           </a:stretch>
@@ -3340,7 +3842,7 @@
           </a:prstGeom>
           <a:extLst>
             <a:ext uri="{C572A759-6A51-4108-AA02-DFA0A04FC94B}">
-              <ma14:wrappingTextBoxFlag xmlns:ma14="http://schemas.microsoft.com/office/mac/drawingml/2011/main" xmlns:a14="http://schemas.microsoft.com/office/drawing/2010/main" xmlns:m="http://schemas.openxmlformats.org/officeDocument/2006/math" xmlns="" val="1"/>
+              <ma14:wrappingTextBoxFlag xmlns="" xmlns:m="http://schemas.openxmlformats.org/officeDocument/2006/math" xmlns:a14="http://schemas.microsoft.com/office/drawing/2010/main" xmlns:ma14="http://schemas.microsoft.com/office/mac/drawingml/2011/main" val="1"/>
             </a:ext>
           </a:extLst>
         </p:spPr>
@@ -3349,7 +3851,8 @@
           <a:lstStyle/>
           <a:p>
             <a:fld id="{86CB4B4D-7CA3-9044-876B-883B54F8677D}" type="slidenum">
-              <a:t>10</a:t>
+              <a:rPr/>
+              <a:t>11</a:t>
             </a:fld>
             <a:endParaRPr/>
           </a:p>
@@ -3364,7 +3867,7 @@
 </p:sld>
 </file>
 
-<file path=ppt/slides/slide11.xml><?xml version="1.0" encoding="utf-8"?>
+<file path=ppt/slides/slide12.xml><?xml version="1.0" encoding="utf-8"?>
 <p:sld xmlns:a="http://schemas.openxmlformats.org/drawingml/2006/main" xmlns:r="http://schemas.openxmlformats.org/officeDocument/2006/relationships" xmlns:p="http://schemas.openxmlformats.org/presentationml/2006/main">
   <p:cSld>
     <p:bg>
@@ -3565,7 +4068,7 @@
           </a:prstGeom>
           <a:extLst>
             <a:ext uri="{C572A759-6A51-4108-AA02-DFA0A04FC94B}">
-              <ma14:wrappingTextBoxFlag xmlns:ma14="http://schemas.microsoft.com/office/mac/drawingml/2011/main" xmlns:a14="http://schemas.microsoft.com/office/drawing/2010/main" xmlns:m="http://schemas.openxmlformats.org/officeDocument/2006/math" xmlns="" val="1"/>
+              <ma14:wrappingTextBoxFlag xmlns="" xmlns:m="http://schemas.openxmlformats.org/officeDocument/2006/math" xmlns:a14="http://schemas.microsoft.com/office/drawing/2010/main" xmlns:ma14="http://schemas.microsoft.com/office/mac/drawingml/2011/main" val="1"/>
             </a:ext>
           </a:extLst>
         </p:spPr>
@@ -3574,7 +4077,7 @@
           <a:lstStyle/>
           <a:p>
             <a:fld id="{86CB4B4D-7CA3-9044-876B-883B54F8677D}" type="slidenum">
-              <a:t>11</a:t>
+              <a:t>12</a:t>
             </a:fld>
             <a:endParaRPr/>
           </a:p>
@@ -3589,7 +4092,7 @@
 </p:sld>
 </file>
 
-<file path=ppt/slides/slide12.xml><?xml version="1.0" encoding="utf-8"?>
+<file path=ppt/slides/slide13.xml><?xml version="1.0" encoding="utf-8"?>
 <p:sld xmlns:a="http://schemas.openxmlformats.org/drawingml/2006/main" xmlns:r="http://schemas.openxmlformats.org/officeDocument/2006/relationships" xmlns:p="http://schemas.openxmlformats.org/presentationml/2006/main">
   <p:cSld>
     <p:bg>
@@ -3701,7 +4204,7 @@
           </a:ln>
           <a:extLst>
             <a:ext uri="{C572A759-6A51-4108-AA02-DFA0A04FC94B}">
-              <ma14:wrappingTextBoxFlag xmlns:ma14="http://schemas.microsoft.com/office/mac/drawingml/2011/main" xmlns:a14="http://schemas.microsoft.com/office/drawing/2010/main" xmlns:m="http://schemas.openxmlformats.org/officeDocument/2006/math" xmlns="" val="1"/>
+              <ma14:wrappingTextBoxFlag xmlns="" xmlns:m="http://schemas.openxmlformats.org/officeDocument/2006/math" xmlns:a14="http://schemas.microsoft.com/office/drawing/2010/main" xmlns:ma14="http://schemas.microsoft.com/office/mac/drawingml/2011/main" val="1"/>
             </a:ext>
           </a:extLst>
         </p:spPr>
@@ -3737,7 +4240,7 @@
           </a:prstGeom>
           <a:extLst>
             <a:ext uri="{C572A759-6A51-4108-AA02-DFA0A04FC94B}">
-              <ma14:wrappingTextBoxFlag xmlns:ma14="http://schemas.microsoft.com/office/mac/drawingml/2011/main" xmlns:a14="http://schemas.microsoft.com/office/drawing/2010/main" xmlns:m="http://schemas.openxmlformats.org/officeDocument/2006/math" xmlns="" val="1"/>
+              <ma14:wrappingTextBoxFlag xmlns="" xmlns:m="http://schemas.openxmlformats.org/officeDocument/2006/math" xmlns:a14="http://schemas.microsoft.com/office/drawing/2010/main" xmlns:ma14="http://schemas.microsoft.com/office/mac/drawingml/2011/main" val="1"/>
             </a:ext>
           </a:extLst>
         </p:spPr>
@@ -3746,7 +4249,7 @@
           <a:lstStyle/>
           <a:p>
             <a:fld id="{86CB4B4D-7CA3-9044-876B-883B54F8677D}" type="slidenum">
-              <a:t>12</a:t>
+              <a:t>13</a:t>
             </a:fld>
             <a:endParaRPr/>
           </a:p>
@@ -3763,7 +4266,7 @@
         <p:push dir="u"/>
       </p:transition>
     </mc:Choice>
-    <mc:Fallback xmlns:a14="http://schemas.microsoft.com/office/drawing/2010/main" xmlns:m="http://schemas.openxmlformats.org/officeDocument/2006/math" xmlns="">
+    <mc:Fallback xmlns="" xmlns:m="http://schemas.openxmlformats.org/officeDocument/2006/math" xmlns:a14="http://schemas.microsoft.com/office/drawing/2010/main">
       <p:transition spd="slow">
         <p:fade/>
       </p:transition>
@@ -4123,7 +4626,7 @@
           </a:prstGeom>
           <a:extLst>
             <a:ext uri="{C572A759-6A51-4108-AA02-DFA0A04FC94B}">
-              <ma14:wrappingTextBoxFlag xmlns:ma14="http://schemas.microsoft.com/office/mac/drawingml/2011/main" xmlns:a14="http://schemas.microsoft.com/office/drawing/2010/main" xmlns:m="http://schemas.openxmlformats.org/officeDocument/2006/math" xmlns="" val="1"/>
+              <ma14:wrappingTextBoxFlag xmlns="" xmlns:m="http://schemas.openxmlformats.org/officeDocument/2006/math" xmlns:a14="http://schemas.microsoft.com/office/drawing/2010/main" xmlns:ma14="http://schemas.microsoft.com/office/mac/drawingml/2011/main" val="1"/>
             </a:ext>
           </a:extLst>
         </p:spPr>
@@ -4166,7 +4669,7 @@
           </a:ln>
           <a:extLst>
             <a:ext uri="{C572A759-6A51-4108-AA02-DFA0A04FC94B}">
-              <ma14:wrappingTextBoxFlag xmlns:ma14="http://schemas.microsoft.com/office/mac/drawingml/2011/main" xmlns:a14="http://schemas.microsoft.com/office/drawing/2010/main" xmlns:m="http://schemas.openxmlformats.org/officeDocument/2006/math" xmlns="" val="1"/>
+              <ma14:wrappingTextBoxFlag xmlns="" xmlns:m="http://schemas.openxmlformats.org/officeDocument/2006/math" xmlns:a14="http://schemas.microsoft.com/office/drawing/2010/main" xmlns:ma14="http://schemas.microsoft.com/office/mac/drawingml/2011/main" val="1"/>
             </a:ext>
           </a:extLst>
         </p:spPr>
@@ -4567,7 +5070,7 @@
           </a:prstGeom>
           <a:extLst>
             <a:ext uri="{C572A759-6A51-4108-AA02-DFA0A04FC94B}">
-              <ma14:wrappingTextBoxFlag xmlns:ma14="http://schemas.microsoft.com/office/mac/drawingml/2011/main" xmlns:a14="http://schemas.microsoft.com/office/drawing/2010/main" xmlns:m="http://schemas.openxmlformats.org/officeDocument/2006/math" xmlns="" val="1"/>
+              <ma14:wrappingTextBoxFlag xmlns="" xmlns:m="http://schemas.openxmlformats.org/officeDocument/2006/math" xmlns:a14="http://schemas.microsoft.com/office/drawing/2010/main" xmlns:ma14="http://schemas.microsoft.com/office/mac/drawingml/2011/main" val="1"/>
             </a:ext>
           </a:extLst>
         </p:spPr>
@@ -4614,7 +5117,7 @@
           </a:ln>
           <a:extLst>
             <a:ext uri="{C572A759-6A51-4108-AA02-DFA0A04FC94B}">
-              <ma14:wrappingTextBoxFlag xmlns:ma14="http://schemas.microsoft.com/office/mac/drawingml/2011/main" xmlns:a14="http://schemas.microsoft.com/office/drawing/2010/main" xmlns:m="http://schemas.openxmlformats.org/officeDocument/2006/math" xmlns="" val="1"/>
+              <ma14:wrappingTextBoxFlag xmlns="" xmlns:m="http://schemas.openxmlformats.org/officeDocument/2006/math" xmlns:a14="http://schemas.microsoft.com/office/drawing/2010/main" xmlns:ma14="http://schemas.microsoft.com/office/mac/drawingml/2011/main" val="1"/>
             </a:ext>
           </a:extLst>
         </p:spPr>
@@ -4687,7 +5190,7 @@
           </a:ln>
           <a:extLst>
             <a:ext uri="{C572A759-6A51-4108-AA02-DFA0A04FC94B}">
-              <ma14:wrappingTextBoxFlag xmlns:ma14="http://schemas.microsoft.com/office/mac/drawingml/2011/main" xmlns:a14="http://schemas.microsoft.com/office/drawing/2010/main" xmlns:m="http://schemas.openxmlformats.org/officeDocument/2006/math" xmlns="" val="1"/>
+              <ma14:wrappingTextBoxFlag xmlns="" xmlns:m="http://schemas.openxmlformats.org/officeDocument/2006/math" xmlns:a14="http://schemas.microsoft.com/office/drawing/2010/main" xmlns:ma14="http://schemas.microsoft.com/office/mac/drawingml/2011/main" val="1"/>
             </a:ext>
           </a:extLst>
         </p:spPr>
@@ -4756,7 +5259,7 @@
           </a:ln>
           <a:extLst>
             <a:ext uri="{C572A759-6A51-4108-AA02-DFA0A04FC94B}">
-              <ma14:wrappingTextBoxFlag xmlns:ma14="http://schemas.microsoft.com/office/mac/drawingml/2011/main" xmlns:a14="http://schemas.microsoft.com/office/drawing/2010/main" xmlns:m="http://schemas.openxmlformats.org/officeDocument/2006/math" xmlns="" val="1"/>
+              <ma14:wrappingTextBoxFlag xmlns="" xmlns:m="http://schemas.openxmlformats.org/officeDocument/2006/math" xmlns:a14="http://schemas.microsoft.com/office/drawing/2010/main" xmlns:ma14="http://schemas.microsoft.com/office/mac/drawingml/2011/main" val="1"/>
             </a:ext>
           </a:extLst>
         </p:spPr>
@@ -4965,7 +5468,7 @@
           </a:prstGeom>
           <a:extLst>
             <a:ext uri="{C572A759-6A51-4108-AA02-DFA0A04FC94B}">
-              <ma14:wrappingTextBoxFlag xmlns="" xmlns:m="http://schemas.openxmlformats.org/officeDocument/2006/math" xmlns:a14="http://schemas.microsoft.com/office/drawing/2010/main" xmlns:ma14="http://schemas.microsoft.com/office/mac/drawingml/2011/main" val="1"/>
+              <ma14:wrappingTextBoxFlag xmlns:ma14="http://schemas.microsoft.com/office/mac/drawingml/2011/main" xmlns:a14="http://schemas.microsoft.com/office/drawing/2010/main" xmlns:m="http://schemas.openxmlformats.org/officeDocument/2006/math" xmlns="" val="1"/>
             </a:ext>
           </a:extLst>
         </p:spPr>
@@ -5012,7 +5515,7 @@
           </a:ln>
           <a:extLst>
             <a:ext uri="{C572A759-6A51-4108-AA02-DFA0A04FC94B}">
-              <ma14:wrappingTextBoxFlag xmlns="" xmlns:m="http://schemas.openxmlformats.org/officeDocument/2006/math" xmlns:a14="http://schemas.microsoft.com/office/drawing/2010/main" xmlns:ma14="http://schemas.microsoft.com/office/mac/drawingml/2011/main" val="1"/>
+              <ma14:wrappingTextBoxFlag xmlns:ma14="http://schemas.microsoft.com/office/mac/drawingml/2011/main" xmlns:a14="http://schemas.microsoft.com/office/drawing/2010/main" xmlns:m="http://schemas.openxmlformats.org/officeDocument/2006/math" xmlns="" val="1"/>
             </a:ext>
           </a:extLst>
         </p:spPr>
@@ -5085,7 +5588,7 @@
           </a:ln>
           <a:extLst>
             <a:ext uri="{C572A759-6A51-4108-AA02-DFA0A04FC94B}">
-              <ma14:wrappingTextBoxFlag xmlns="" xmlns:m="http://schemas.openxmlformats.org/officeDocument/2006/math" xmlns:a14="http://schemas.microsoft.com/office/drawing/2010/main" xmlns:ma14="http://schemas.microsoft.com/office/mac/drawingml/2011/main" val="1"/>
+              <ma14:wrappingTextBoxFlag xmlns:ma14="http://schemas.microsoft.com/office/mac/drawingml/2011/main" xmlns:a14="http://schemas.microsoft.com/office/drawing/2010/main" xmlns:m="http://schemas.openxmlformats.org/officeDocument/2006/math" xmlns="" val="1"/>
             </a:ext>
           </a:extLst>
         </p:spPr>
@@ -5154,7 +5657,7 @@
           </a:ln>
           <a:extLst>
             <a:ext uri="{C572A759-6A51-4108-AA02-DFA0A04FC94B}">
-              <ma14:wrappingTextBoxFlag xmlns="" xmlns:m="http://schemas.openxmlformats.org/officeDocument/2006/math" xmlns:a14="http://schemas.microsoft.com/office/drawing/2010/main" xmlns:ma14="http://schemas.microsoft.com/office/mac/drawingml/2011/main" val="1"/>
+              <ma14:wrappingTextBoxFlag xmlns:ma14="http://schemas.microsoft.com/office/mac/drawingml/2011/main" xmlns:a14="http://schemas.microsoft.com/office/drawing/2010/main" xmlns:m="http://schemas.openxmlformats.org/officeDocument/2006/math" xmlns="" val="1"/>
             </a:ext>
           </a:extLst>
         </p:spPr>
@@ -5378,7 +5881,7 @@
           </a:prstGeom>
           <a:extLst>
             <a:ext uri="{C572A759-6A51-4108-AA02-DFA0A04FC94B}">
-              <ma14:wrappingTextBoxFlag xmlns:ma14="http://schemas.microsoft.com/office/mac/drawingml/2011/main" xmlns:a14="http://schemas.microsoft.com/office/drawing/2010/main" xmlns:m="http://schemas.openxmlformats.org/officeDocument/2006/math" xmlns="" val="1"/>
+              <ma14:wrappingTextBoxFlag xmlns="" xmlns:m="http://schemas.openxmlformats.org/officeDocument/2006/math" xmlns:a14="http://schemas.microsoft.com/office/drawing/2010/main" xmlns:ma14="http://schemas.microsoft.com/office/mac/drawingml/2011/main" val="1"/>
             </a:ext>
           </a:extLst>
         </p:spPr>
@@ -5425,7 +5928,7 @@
           </a:ln>
           <a:extLst>
             <a:ext uri="{C572A759-6A51-4108-AA02-DFA0A04FC94B}">
-              <ma14:wrappingTextBoxFlag xmlns:ma14="http://schemas.microsoft.com/office/mac/drawingml/2011/main" xmlns:a14="http://schemas.microsoft.com/office/drawing/2010/main" xmlns:m="http://schemas.openxmlformats.org/officeDocument/2006/math" xmlns="" val="1"/>
+              <ma14:wrappingTextBoxFlag xmlns="" xmlns:m="http://schemas.openxmlformats.org/officeDocument/2006/math" xmlns:a14="http://schemas.microsoft.com/office/drawing/2010/main" xmlns:ma14="http://schemas.microsoft.com/office/mac/drawingml/2011/main" val="1"/>
             </a:ext>
           </a:extLst>
         </p:spPr>
@@ -5498,7 +6001,7 @@
           </a:ln>
           <a:extLst>
             <a:ext uri="{C572A759-6A51-4108-AA02-DFA0A04FC94B}">
-              <ma14:wrappingTextBoxFlag xmlns:ma14="http://schemas.microsoft.com/office/mac/drawingml/2011/main" xmlns:a14="http://schemas.microsoft.com/office/drawing/2010/main" xmlns:m="http://schemas.openxmlformats.org/officeDocument/2006/math" xmlns="" val="1"/>
+              <ma14:wrappingTextBoxFlag xmlns="" xmlns:m="http://schemas.openxmlformats.org/officeDocument/2006/math" xmlns:a14="http://schemas.microsoft.com/office/drawing/2010/main" xmlns:ma14="http://schemas.microsoft.com/office/mac/drawingml/2011/main" val="1"/>
             </a:ext>
           </a:extLst>
         </p:spPr>
@@ -5567,7 +6070,7 @@
           </a:ln>
           <a:extLst>
             <a:ext uri="{C572A759-6A51-4108-AA02-DFA0A04FC94B}">
-              <ma14:wrappingTextBoxFlag xmlns:ma14="http://schemas.microsoft.com/office/mac/drawingml/2011/main" xmlns:a14="http://schemas.microsoft.com/office/drawing/2010/main" xmlns:m="http://schemas.openxmlformats.org/officeDocument/2006/math" xmlns="" val="1"/>
+              <ma14:wrappingTextBoxFlag xmlns="" xmlns:m="http://schemas.openxmlformats.org/officeDocument/2006/math" xmlns:a14="http://schemas.microsoft.com/office/drawing/2010/main" xmlns:ma14="http://schemas.microsoft.com/office/mac/drawingml/2011/main" val="1"/>
             </a:ext>
           </a:extLst>
         </p:spPr>
@@ -5792,7 +6295,7 @@
           </a:prstGeom>
           <a:extLst>
             <a:ext uri="{C572A759-6A51-4108-AA02-DFA0A04FC94B}">
-              <ma14:wrappingTextBoxFlag xmlns:ma14="http://schemas.microsoft.com/office/mac/drawingml/2011/main" xmlns:a14="http://schemas.microsoft.com/office/drawing/2010/main" xmlns:m="http://schemas.openxmlformats.org/officeDocument/2006/math" xmlns="" val="1"/>
+              <ma14:wrappingTextBoxFlag xmlns="" xmlns:m="http://schemas.openxmlformats.org/officeDocument/2006/math" xmlns:a14="http://schemas.microsoft.com/office/drawing/2010/main" xmlns:ma14="http://schemas.microsoft.com/office/mac/drawingml/2011/main" val="1"/>
             </a:ext>
           </a:extLst>
         </p:spPr>
@@ -5839,7 +6342,7 @@
           </a:ln>
           <a:extLst>
             <a:ext uri="{C572A759-6A51-4108-AA02-DFA0A04FC94B}">
-              <ma14:wrappingTextBoxFlag xmlns:ma14="http://schemas.microsoft.com/office/mac/drawingml/2011/main" xmlns:a14="http://schemas.microsoft.com/office/drawing/2010/main" xmlns:m="http://schemas.openxmlformats.org/officeDocument/2006/math" xmlns="" val="1"/>
+              <ma14:wrappingTextBoxFlag xmlns="" xmlns:m="http://schemas.openxmlformats.org/officeDocument/2006/math" xmlns:a14="http://schemas.microsoft.com/office/drawing/2010/main" xmlns:ma14="http://schemas.microsoft.com/office/mac/drawingml/2011/main" val="1"/>
             </a:ext>
           </a:extLst>
         </p:spPr>
@@ -5912,7 +6415,7 @@
           </a:ln>
           <a:extLst>
             <a:ext uri="{C572A759-6A51-4108-AA02-DFA0A04FC94B}">
-              <ma14:wrappingTextBoxFlag xmlns:ma14="http://schemas.microsoft.com/office/mac/drawingml/2011/main" xmlns:a14="http://schemas.microsoft.com/office/drawing/2010/main" xmlns:m="http://schemas.openxmlformats.org/officeDocument/2006/math" xmlns="" val="1"/>
+              <ma14:wrappingTextBoxFlag xmlns="" xmlns:m="http://schemas.openxmlformats.org/officeDocument/2006/math" xmlns:a14="http://schemas.microsoft.com/office/drawing/2010/main" xmlns:ma14="http://schemas.microsoft.com/office/mac/drawingml/2011/main" val="1"/>
             </a:ext>
           </a:extLst>
         </p:spPr>
@@ -5981,7 +6484,7 @@
           </a:ln>
           <a:extLst>
             <a:ext uri="{C572A759-6A51-4108-AA02-DFA0A04FC94B}">
-              <ma14:wrappingTextBoxFlag xmlns:ma14="http://schemas.microsoft.com/office/mac/drawingml/2011/main" xmlns:a14="http://schemas.microsoft.com/office/drawing/2010/main" xmlns:m="http://schemas.openxmlformats.org/officeDocument/2006/math" xmlns="" val="1"/>
+              <ma14:wrappingTextBoxFlag xmlns="" xmlns:m="http://schemas.openxmlformats.org/officeDocument/2006/math" xmlns:a14="http://schemas.microsoft.com/office/drawing/2010/main" xmlns:ma14="http://schemas.microsoft.com/office/mac/drawingml/2011/main" val="1"/>
             </a:ext>
           </a:extLst>
         </p:spPr>
@@ -6212,7 +6715,7 @@
           </a:prstGeom>
           <a:extLst>
             <a:ext uri="{C572A759-6A51-4108-AA02-DFA0A04FC94B}">
-              <ma14:wrappingTextBoxFlag xmlns:ma14="http://schemas.microsoft.com/office/mac/drawingml/2011/main" xmlns:a14="http://schemas.microsoft.com/office/drawing/2010/main" xmlns:m="http://schemas.openxmlformats.org/officeDocument/2006/math" xmlns="" val="1"/>
+              <ma14:wrappingTextBoxFlag xmlns="" xmlns:m="http://schemas.openxmlformats.org/officeDocument/2006/math" xmlns:a14="http://schemas.microsoft.com/office/drawing/2010/main" xmlns:ma14="http://schemas.microsoft.com/office/mac/drawingml/2011/main" val="1"/>
             </a:ext>
           </a:extLst>
         </p:spPr>
@@ -6259,7 +6762,7 @@
           </a:ln>
           <a:extLst>
             <a:ext uri="{C572A759-6A51-4108-AA02-DFA0A04FC94B}">
-              <ma14:wrappingTextBoxFlag xmlns:ma14="http://schemas.microsoft.com/office/mac/drawingml/2011/main" xmlns:a14="http://schemas.microsoft.com/office/drawing/2010/main" xmlns:m="http://schemas.openxmlformats.org/officeDocument/2006/math" xmlns="" val="1"/>
+              <ma14:wrappingTextBoxFlag xmlns="" xmlns:m="http://schemas.openxmlformats.org/officeDocument/2006/math" xmlns:a14="http://schemas.microsoft.com/office/drawing/2010/main" xmlns:ma14="http://schemas.microsoft.com/office/mac/drawingml/2011/main" val="1"/>
             </a:ext>
           </a:extLst>
         </p:spPr>
@@ -6332,7 +6835,7 @@
           </a:ln>
           <a:extLst>
             <a:ext uri="{C572A759-6A51-4108-AA02-DFA0A04FC94B}">
-              <ma14:wrappingTextBoxFlag xmlns:ma14="http://schemas.microsoft.com/office/mac/drawingml/2011/main" xmlns:a14="http://schemas.microsoft.com/office/drawing/2010/main" xmlns:m="http://schemas.openxmlformats.org/officeDocument/2006/math" xmlns="" val="1"/>
+              <ma14:wrappingTextBoxFlag xmlns="" xmlns:m="http://schemas.openxmlformats.org/officeDocument/2006/math" xmlns:a14="http://schemas.microsoft.com/office/drawing/2010/main" xmlns:ma14="http://schemas.microsoft.com/office/mac/drawingml/2011/main" val="1"/>
             </a:ext>
           </a:extLst>
         </p:spPr>
@@ -6401,7 +6904,7 @@
           </a:ln>
           <a:extLst>
             <a:ext uri="{C572A759-6A51-4108-AA02-DFA0A04FC94B}">
-              <ma14:wrappingTextBoxFlag xmlns:ma14="http://schemas.microsoft.com/office/mac/drawingml/2011/main" xmlns:a14="http://schemas.microsoft.com/office/drawing/2010/main" xmlns:m="http://schemas.openxmlformats.org/officeDocument/2006/math" xmlns="" val="1"/>
+              <ma14:wrappingTextBoxFlag xmlns="" xmlns:m="http://schemas.openxmlformats.org/officeDocument/2006/math" xmlns:a14="http://schemas.microsoft.com/office/drawing/2010/main" xmlns:ma14="http://schemas.microsoft.com/office/mac/drawingml/2011/main" val="1"/>
             </a:ext>
           </a:extLst>
         </p:spPr>
@@ -6497,7 +7000,7 @@
           </a:prstGeom>
           <a:extLst>
             <a:ext uri="{C572A759-6A51-4108-AA02-DFA0A04FC94B}">
-              <ma14:wrappingTextBoxFlag xmlns="" xmlns:m="http://schemas.openxmlformats.org/officeDocument/2006/math" xmlns:a14="http://schemas.microsoft.com/office/drawing/2010/main" xmlns:ma14="http://schemas.microsoft.com/office/mac/drawingml/2011/main" val="1"/>
+              <ma14:wrappingTextBoxFlag xmlns:ma14="http://schemas.microsoft.com/office/mac/drawingml/2011/main" xmlns:a14="http://schemas.microsoft.com/office/drawing/2010/main" xmlns:m="http://schemas.openxmlformats.org/officeDocument/2006/math" xmlns="" val="1"/>
             </a:ext>
           </a:extLst>
         </p:spPr>
@@ -7165,7 +7668,7 @@
           </a:ln>
           <a:extLst>
             <a:ext uri="{C572A759-6A51-4108-AA02-DFA0A04FC94B}">
-              <ma14:wrappingTextBoxFlag xmlns="" xmlns:m="http://schemas.openxmlformats.org/officeDocument/2006/math" xmlns:a14="http://schemas.microsoft.com/office/drawing/2010/main" xmlns:ma14="http://schemas.microsoft.com/office/mac/drawingml/2011/main" val="1"/>
+              <ma14:wrappingTextBoxFlag xmlns:ma14="http://schemas.microsoft.com/office/mac/drawingml/2011/main" xmlns:a14="http://schemas.microsoft.com/office/drawing/2010/main" xmlns:m="http://schemas.openxmlformats.org/officeDocument/2006/math" xmlns="" val="1"/>
             </a:ext>
           </a:extLst>
         </p:spPr>
@@ -7499,7 +8002,7 @@
           </a:ln>
           <a:extLst>
             <a:ext uri="{C572A759-6A51-4108-AA02-DFA0A04FC94B}">
-              <ma14:wrappingTextBoxFlag xmlns="" xmlns:m="http://schemas.openxmlformats.org/officeDocument/2006/math" xmlns:a14="http://schemas.microsoft.com/office/drawing/2010/main" xmlns:ma14="http://schemas.microsoft.com/office/mac/drawingml/2011/main" val="1"/>
+              <ma14:wrappingTextBoxFlag xmlns:ma14="http://schemas.microsoft.com/office/mac/drawingml/2011/main" xmlns:a14="http://schemas.microsoft.com/office/drawing/2010/main" xmlns:m="http://schemas.openxmlformats.org/officeDocument/2006/math" xmlns="" val="1"/>
             </a:ext>
           </a:extLst>
         </p:spPr>
@@ -7584,7 +8087,7 @@
           </a:prstGeom>
           <a:extLst>
             <a:ext uri="{C572A759-6A51-4108-AA02-DFA0A04FC94B}">
-              <ma14:wrappingTextBoxFlag xmlns="" xmlns:m="http://schemas.openxmlformats.org/officeDocument/2006/math" xmlns:a14="http://schemas.microsoft.com/office/drawing/2010/main" xmlns:ma14="http://schemas.microsoft.com/office/mac/drawingml/2011/main" val="1"/>
+              <ma14:wrappingTextBoxFlag xmlns:ma14="http://schemas.microsoft.com/office/mac/drawingml/2011/main" xmlns:a14="http://schemas.microsoft.com/office/drawing/2010/main" xmlns:m="http://schemas.openxmlformats.org/officeDocument/2006/math" xmlns="" val="1"/>
             </a:ext>
           </a:extLst>
         </p:spPr>
@@ -7906,7 +8409,7 @@
           </a:ln>
           <a:extLst>
             <a:ext uri="{C572A759-6A51-4108-AA02-DFA0A04FC94B}">
-              <ma14:wrappingTextBoxFlag xmlns="" xmlns:m="http://schemas.openxmlformats.org/officeDocument/2006/math" xmlns:a14="http://schemas.microsoft.com/office/drawing/2010/main" xmlns:ma14="http://schemas.microsoft.com/office/mac/drawingml/2011/main" val="1"/>
+              <ma14:wrappingTextBoxFlag xmlns:ma14="http://schemas.microsoft.com/office/mac/drawingml/2011/main" xmlns:a14="http://schemas.microsoft.com/office/drawing/2010/main" xmlns:m="http://schemas.openxmlformats.org/officeDocument/2006/math" xmlns="" val="1"/>
             </a:ext>
           </a:extLst>
         </p:spPr>
@@ -8150,7 +8653,7 @@
           </a:ln>
           <a:extLst>
             <a:ext uri="{C572A759-6A51-4108-AA02-DFA0A04FC94B}">
-              <ma14:wrappingTextBoxFlag xmlns="" xmlns:m="http://schemas.openxmlformats.org/officeDocument/2006/math" xmlns:a14="http://schemas.microsoft.com/office/drawing/2010/main" xmlns:ma14="http://schemas.microsoft.com/office/mac/drawingml/2011/main" val="1"/>
+              <ma14:wrappingTextBoxFlag xmlns:ma14="http://schemas.microsoft.com/office/mac/drawingml/2011/main" xmlns:a14="http://schemas.microsoft.com/office/drawing/2010/main" xmlns:m="http://schemas.openxmlformats.org/officeDocument/2006/math" xmlns="" val="1"/>
             </a:ext>
           </a:extLst>
         </p:spPr>

</xml_diff>